<commit_message>
frontiers, point on violin
</commit_message>
<xml_diff>
--- a/figures/flow chart.pptx
+++ b/figures/flow chart.pptx
@@ -244,7 +244,7 @@
           <a:p>
             <a:fld id="{42C1B6C2-A197-4731-A0B2-F9ADA2CD47A2}" type="datetimeFigureOut">
               <a:rPr lang="fr-FR" smtClean="0"/>
-              <a:t>16/04/2024</a:t>
+              <a:t>11/05/2024</a:t>
             </a:fld>
             <a:endParaRPr lang="fr-FR"/>
           </a:p>
@@ -414,7 +414,7 @@
           <a:p>
             <a:fld id="{42C1B6C2-A197-4731-A0B2-F9ADA2CD47A2}" type="datetimeFigureOut">
               <a:rPr lang="fr-FR" smtClean="0"/>
-              <a:t>16/04/2024</a:t>
+              <a:t>11/05/2024</a:t>
             </a:fld>
             <a:endParaRPr lang="fr-FR"/>
           </a:p>
@@ -594,7 +594,7 @@
           <a:p>
             <a:fld id="{42C1B6C2-A197-4731-A0B2-F9ADA2CD47A2}" type="datetimeFigureOut">
               <a:rPr lang="fr-FR" smtClean="0"/>
-              <a:t>16/04/2024</a:t>
+              <a:t>11/05/2024</a:t>
             </a:fld>
             <a:endParaRPr lang="fr-FR"/>
           </a:p>
@@ -764,7 +764,7 @@
           <a:p>
             <a:fld id="{42C1B6C2-A197-4731-A0B2-F9ADA2CD47A2}" type="datetimeFigureOut">
               <a:rPr lang="fr-FR" smtClean="0"/>
-              <a:t>16/04/2024</a:t>
+              <a:t>11/05/2024</a:t>
             </a:fld>
             <a:endParaRPr lang="fr-FR"/>
           </a:p>
@@ -1008,7 +1008,7 @@
           <a:p>
             <a:fld id="{42C1B6C2-A197-4731-A0B2-F9ADA2CD47A2}" type="datetimeFigureOut">
               <a:rPr lang="fr-FR" smtClean="0"/>
-              <a:t>16/04/2024</a:t>
+              <a:t>11/05/2024</a:t>
             </a:fld>
             <a:endParaRPr lang="fr-FR"/>
           </a:p>
@@ -1240,7 +1240,7 @@
           <a:p>
             <a:fld id="{42C1B6C2-A197-4731-A0B2-F9ADA2CD47A2}" type="datetimeFigureOut">
               <a:rPr lang="fr-FR" smtClean="0"/>
-              <a:t>16/04/2024</a:t>
+              <a:t>11/05/2024</a:t>
             </a:fld>
             <a:endParaRPr lang="fr-FR"/>
           </a:p>
@@ -1607,7 +1607,7 @@
           <a:p>
             <a:fld id="{42C1B6C2-A197-4731-A0B2-F9ADA2CD47A2}" type="datetimeFigureOut">
               <a:rPr lang="fr-FR" smtClean="0"/>
-              <a:t>16/04/2024</a:t>
+              <a:t>11/05/2024</a:t>
             </a:fld>
             <a:endParaRPr lang="fr-FR"/>
           </a:p>
@@ -1725,7 +1725,7 @@
           <a:p>
             <a:fld id="{42C1B6C2-A197-4731-A0B2-F9ADA2CD47A2}" type="datetimeFigureOut">
               <a:rPr lang="fr-FR" smtClean="0"/>
-              <a:t>16/04/2024</a:t>
+              <a:t>11/05/2024</a:t>
             </a:fld>
             <a:endParaRPr lang="fr-FR"/>
           </a:p>
@@ -1820,7 +1820,7 @@
           <a:p>
             <a:fld id="{42C1B6C2-A197-4731-A0B2-F9ADA2CD47A2}" type="datetimeFigureOut">
               <a:rPr lang="fr-FR" smtClean="0"/>
-              <a:t>16/04/2024</a:t>
+              <a:t>11/05/2024</a:t>
             </a:fld>
             <a:endParaRPr lang="fr-FR"/>
           </a:p>
@@ -2097,7 +2097,7 @@
           <a:p>
             <a:fld id="{42C1B6C2-A197-4731-A0B2-F9ADA2CD47A2}" type="datetimeFigureOut">
               <a:rPr lang="fr-FR" smtClean="0"/>
-              <a:t>16/04/2024</a:t>
+              <a:t>11/05/2024</a:t>
             </a:fld>
             <a:endParaRPr lang="fr-FR"/>
           </a:p>
@@ -2354,7 +2354,7 @@
           <a:p>
             <a:fld id="{42C1B6C2-A197-4731-A0B2-F9ADA2CD47A2}" type="datetimeFigureOut">
               <a:rPr lang="fr-FR" smtClean="0"/>
-              <a:t>16/04/2024</a:t>
+              <a:t>11/05/2024</a:t>
             </a:fld>
             <a:endParaRPr lang="fr-FR"/>
           </a:p>
@@ -2567,7 +2567,7 @@
           <a:p>
             <a:fld id="{42C1B6C2-A197-4731-A0B2-F9ADA2CD47A2}" type="datetimeFigureOut">
               <a:rPr lang="fr-FR" smtClean="0"/>
-              <a:t>16/04/2024</a:t>
+              <a:t>11/05/2024</a:t>
             </a:fld>
             <a:endParaRPr lang="fr-FR"/>
           </a:p>
@@ -3605,7 +3605,7 @@
         <p:spPr bwMode="auto">
           <a:xfrm>
             <a:off x="988378" y="4814888"/>
-            <a:ext cx="2762250" cy="452437"/>
+            <a:ext cx="2762250" cy="515937"/>
           </a:xfrm>
           <a:prstGeom prst="roundRect">
             <a:avLst>
@@ -3661,22 +3661,52 @@
                 <a:ea typeface="Calibri" panose="020F0502020204030204" pitchFamily="34" charset="0"/>
                 <a:cs typeface="Times New Roman" panose="02020603050405020304" pitchFamily="18" charset="0"/>
               </a:rPr>
-              <a:t>Abstract screened </a:t>
-            </a:r>
-            <a:r>
-              <a:rPr kumimoji="0" lang="fr-FR" altLang="fr-FR" sz="1600" b="1" i="0" u="none" strike="noStrike" cap="none" normalizeH="0" baseline="0" noProof="1" smtClean="0">
+              <a:t>Screening </a:t>
+            </a:r>
+            <a:r>
+              <a:rPr kumimoji="0" lang="fr-FR" altLang="fr-FR" sz="1600" b="0" i="0" u="none" strike="noStrike" cap="none" normalizeH="0" baseline="0" noProof="1" smtClean="0">
                 <a:ln>
                   <a:noFill/>
                 </a:ln>
                 <a:solidFill>
-                  <a:srgbClr val="0040CF"/>
+                  <a:srgbClr val="002060"/>
                 </a:solidFill>
                 <a:effectLst/>
                 <a:latin typeface="Calibri" panose="020F0502020204030204" pitchFamily="34" charset="0"/>
                 <a:ea typeface="Calibri" panose="020F0502020204030204" pitchFamily="34" charset="0"/>
                 <a:cs typeface="Times New Roman" panose="02020603050405020304" pitchFamily="18" charset="0"/>
               </a:rPr>
-              <a:t>(n = </a:t>
+              <a:t>of title and abstract </a:t>
+            </a:r>
+            <a:r>
+              <a:rPr kumimoji="0" lang="fr-FR" altLang="fr-FR" sz="1600" b="1" i="0" u="none" strike="noStrike" cap="none" normalizeH="0" baseline="0" noProof="1" smtClean="0">
+                <a:ln>
+                  <a:noFill/>
+                </a:ln>
+                <a:solidFill>
+                  <a:srgbClr val="0040CF"/>
+                </a:solidFill>
+                <a:effectLst/>
+                <a:latin typeface="Calibri" panose="020F0502020204030204" pitchFamily="34" charset="0"/>
+                <a:ea typeface="Calibri" panose="020F0502020204030204" pitchFamily="34" charset="0"/>
+                <a:cs typeface="Times New Roman" panose="02020603050405020304" pitchFamily="18" charset="0"/>
+              </a:rPr>
+              <a:t>(</a:t>
+            </a:r>
+            <a:r>
+              <a:rPr kumimoji="0" lang="fr-FR" altLang="fr-FR" sz="1600" b="1" i="0" u="none" strike="noStrike" cap="none" normalizeH="0" baseline="0" noProof="1" smtClean="0">
+                <a:ln>
+                  <a:noFill/>
+                </a:ln>
+                <a:solidFill>
+                  <a:srgbClr val="0040CF"/>
+                </a:solidFill>
+                <a:effectLst/>
+                <a:latin typeface="Calibri" panose="020F0502020204030204" pitchFamily="34" charset="0"/>
+                <a:ea typeface="Calibri" panose="020F0502020204030204" pitchFamily="34" charset="0"/>
+                <a:cs typeface="Times New Roman" panose="02020603050405020304" pitchFamily="18" charset="0"/>
+              </a:rPr>
+              <a:t>n = </a:t>
             </a:r>
             <a:r>
               <a:rPr lang="fr-FR" altLang="fr-FR" sz="1600" b="1" noProof="1" smtClean="0">
@@ -3937,37 +3967,7 @@
                 <a:ea typeface="Calibri" panose="020F0502020204030204" pitchFamily="34" charset="0"/>
                 <a:cs typeface="Times New Roman" panose="02020603050405020304" pitchFamily="18" charset="0"/>
               </a:rPr>
-              <a:t>(</a:t>
-            </a:r>
-            <a:r>
-              <a:rPr kumimoji="0" lang="fr-FR" altLang="fr-FR" sz="1400" b="1" i="0" u="none" strike="noStrike" cap="none" normalizeH="0" baseline="0" noProof="1" smtClean="0">
-                <a:ln>
-                  <a:noFill/>
-                </a:ln>
-                <a:solidFill>
-                  <a:srgbClr val="0040CF"/>
-                </a:solidFill>
-                <a:effectLst/>
-                <a:latin typeface="Calibri" panose="020F0502020204030204" pitchFamily="34" charset="0"/>
-                <a:ea typeface="Calibri" panose="020F0502020204030204" pitchFamily="34" charset="0"/>
-                <a:cs typeface="Times New Roman" panose="02020603050405020304" pitchFamily="18" charset="0"/>
-              </a:rPr>
-              <a:t>n = </a:t>
-            </a:r>
-            <a:r>
-              <a:rPr kumimoji="0" lang="fr-FR" altLang="fr-FR" sz="1400" b="1" i="0" u="none" strike="noStrike" cap="none" normalizeH="0" baseline="0" noProof="1" smtClean="0">
-                <a:ln>
-                  <a:noFill/>
-                </a:ln>
-                <a:solidFill>
-                  <a:srgbClr val="0040CF"/>
-                </a:solidFill>
-                <a:effectLst/>
-                <a:latin typeface="Calibri" panose="020F0502020204030204" pitchFamily="34" charset="0"/>
-                <a:ea typeface="Calibri" panose="020F0502020204030204" pitchFamily="34" charset="0"/>
-                <a:cs typeface="Times New Roman" panose="02020603050405020304" pitchFamily="18" charset="0"/>
-              </a:rPr>
-              <a:t>1391)</a:t>
+              <a:t>(n = 1391)</a:t>
             </a:r>
             <a:endParaRPr kumimoji="0" lang="fr-FR" altLang="fr-FR" sz="1800" b="0" i="0" u="none" strike="noStrike" cap="none" normalizeH="0" baseline="0" noProof="1" smtClean="0">
               <a:ln>
@@ -4049,22 +4049,52 @@
                 <a:ea typeface="Calibri" panose="020F0502020204030204" pitchFamily="34" charset="0"/>
                 <a:cs typeface="Times New Roman" panose="02020603050405020304" pitchFamily="18" charset="0"/>
               </a:rPr>
-              <a:t>Studies excluded on abstract </a:t>
-            </a:r>
-            <a:r>
-              <a:rPr kumimoji="0" lang="fr-FR" altLang="fr-FR" sz="1400" b="1" i="0" u="none" strike="noStrike" cap="none" normalizeH="0" baseline="0" noProof="1" smtClean="0">
+              <a:t>Studies excluded on </a:t>
+            </a:r>
+            <a:r>
+              <a:rPr kumimoji="0" lang="fr-FR" altLang="fr-FR" sz="1400" b="0" i="0" u="none" strike="noStrike" cap="none" normalizeH="0" baseline="0" noProof="1" smtClean="0">
                 <a:ln>
                   <a:noFill/>
                 </a:ln>
                 <a:solidFill>
-                  <a:srgbClr val="0040CF"/>
+                  <a:srgbClr val="002060"/>
                 </a:solidFill>
                 <a:effectLst/>
                 <a:latin typeface="Calibri" panose="020F0502020204030204" pitchFamily="34" charset="0"/>
                 <a:ea typeface="Calibri" panose="020F0502020204030204" pitchFamily="34" charset="0"/>
                 <a:cs typeface="Times New Roman" panose="02020603050405020304" pitchFamily="18" charset="0"/>
               </a:rPr>
-              <a:t>(n = </a:t>
+              <a:t>title or abstract </a:t>
+            </a:r>
+            <a:r>
+              <a:rPr kumimoji="0" lang="fr-FR" altLang="fr-FR" sz="1400" b="1" i="0" u="none" strike="noStrike" cap="none" normalizeH="0" baseline="0" noProof="1" smtClean="0">
+                <a:ln>
+                  <a:noFill/>
+                </a:ln>
+                <a:solidFill>
+                  <a:srgbClr val="0040CF"/>
+                </a:solidFill>
+                <a:effectLst/>
+                <a:latin typeface="Calibri" panose="020F0502020204030204" pitchFamily="34" charset="0"/>
+                <a:ea typeface="Calibri" panose="020F0502020204030204" pitchFamily="34" charset="0"/>
+                <a:cs typeface="Times New Roman" panose="02020603050405020304" pitchFamily="18" charset="0"/>
+              </a:rPr>
+              <a:t>(n </a:t>
+            </a:r>
+            <a:r>
+              <a:rPr kumimoji="0" lang="fr-FR" altLang="fr-FR" sz="1400" b="1" i="0" u="none" strike="noStrike" cap="none" normalizeH="0" baseline="0" noProof="1" smtClean="0">
+                <a:ln>
+                  <a:noFill/>
+                </a:ln>
+                <a:solidFill>
+                  <a:srgbClr val="0040CF"/>
+                </a:solidFill>
+                <a:effectLst/>
+                <a:latin typeface="Calibri" panose="020F0502020204030204" pitchFamily="34" charset="0"/>
+                <a:ea typeface="Calibri" panose="020F0502020204030204" pitchFamily="34" charset="0"/>
+                <a:cs typeface="Times New Roman" panose="02020603050405020304" pitchFamily="18" charset="0"/>
+              </a:rPr>
+              <a:t>= </a:t>
             </a:r>
             <a:r>
               <a:rPr lang="fr-FR" altLang="fr-FR" sz="1400" b="1" noProof="1" smtClean="0">
@@ -4508,22 +4538,7 @@
                 <a:ea typeface="Calibri" panose="020F0502020204030204" pitchFamily="34" charset="0"/>
                 <a:cs typeface="Times New Roman" panose="02020603050405020304" pitchFamily="18" charset="0"/>
               </a:rPr>
-              <a:t>Full text not available (n = </a:t>
-            </a:r>
-            <a:r>
-              <a:rPr kumimoji="0" lang="fr-FR" altLang="fr-FR" sz="1200" b="0" i="0" u="none" strike="noStrike" cap="none" normalizeH="0" baseline="0" noProof="1" smtClean="0">
-                <a:ln>
-                  <a:noFill/>
-                </a:ln>
-                <a:solidFill>
-                  <a:srgbClr val="002060"/>
-                </a:solidFill>
-                <a:effectLst/>
-                <a:latin typeface="Calibri" panose="020F0502020204030204" pitchFamily="34" charset="0"/>
-                <a:ea typeface="Calibri" panose="020F0502020204030204" pitchFamily="34" charset="0"/>
-                <a:cs typeface="Times New Roman" panose="02020603050405020304" pitchFamily="18" charset="0"/>
-              </a:rPr>
-              <a:t>4)</a:t>
+              <a:t>Full text not available (n = 4)</a:t>
             </a:r>
             <a:endParaRPr kumimoji="0" lang="fr-FR" altLang="fr-FR" sz="400" b="0" i="0" u="none" strike="noStrike" cap="none" normalizeH="0" baseline="0" noProof="1" smtClean="0">
               <a:ln>
@@ -4565,22 +4580,7 @@
                 <a:ea typeface="Calibri" panose="020F0502020204030204" pitchFamily="34" charset="0"/>
                 <a:cs typeface="Times New Roman" panose="02020603050405020304" pitchFamily="18" charset="0"/>
               </a:rPr>
-              <a:t>No health (or economic) impact assessment (n = </a:t>
-            </a:r>
-            <a:r>
-              <a:rPr kumimoji="0" lang="fr-FR" altLang="fr-FR" sz="1200" b="0" i="0" u="none" strike="noStrike" cap="none" normalizeH="0" baseline="0" noProof="1" smtClean="0">
-                <a:ln>
-                  <a:noFill/>
-                </a:ln>
-                <a:solidFill>
-                  <a:srgbClr val="002060"/>
-                </a:solidFill>
-                <a:effectLst/>
-                <a:latin typeface="Calibri" panose="020F0502020204030204" pitchFamily="34" charset="0"/>
-                <a:ea typeface="Calibri" panose="020F0502020204030204" pitchFamily="34" charset="0"/>
-                <a:cs typeface="Times New Roman" panose="02020603050405020304" pitchFamily="18" charset="0"/>
-              </a:rPr>
-              <a:t>10)</a:t>
+              <a:t>No health (or economic) impact assessment (n = 10)</a:t>
             </a:r>
             <a:endParaRPr kumimoji="0" lang="fr-FR" altLang="fr-FR" sz="400" b="0" i="0" u="none" strike="noStrike" cap="none" normalizeH="0" baseline="0" noProof="1" smtClean="0">
               <a:ln>
@@ -4622,22 +4622,7 @@
                 <a:ea typeface="Calibri" panose="020F0502020204030204" pitchFamily="34" charset="0"/>
                 <a:cs typeface="Times New Roman" panose="02020603050405020304" pitchFamily="18" charset="0"/>
               </a:rPr>
-              <a:t>The aim of the scenario(s) is not carbon neutrality (n = </a:t>
-            </a:r>
-            <a:r>
-              <a:rPr kumimoji="0" lang="fr-FR" altLang="fr-FR" sz="1200" b="0" i="0" u="none" strike="noStrike" cap="none" normalizeH="0" baseline="0" noProof="1" smtClean="0">
-                <a:ln>
-                  <a:noFill/>
-                </a:ln>
-                <a:solidFill>
-                  <a:srgbClr val="002060"/>
-                </a:solidFill>
-                <a:effectLst/>
-                <a:latin typeface="Calibri" panose="020F0502020204030204" pitchFamily="34" charset="0"/>
-                <a:ea typeface="Calibri" panose="020F0502020204030204" pitchFamily="34" charset="0"/>
-                <a:cs typeface="Times New Roman" panose="02020603050405020304" pitchFamily="18" charset="0"/>
-              </a:rPr>
-              <a:t>12)</a:t>
+              <a:t>The aim of the scenario(s) is not carbon neutrality (n = 12)</a:t>
             </a:r>
             <a:endParaRPr kumimoji="0" lang="fr-FR" altLang="fr-FR" sz="1800" b="0" i="0" u="none" strike="noStrike" cap="none" normalizeH="0" baseline="0" noProof="1" smtClean="0">
               <a:ln>
@@ -5547,22 +5532,7 @@
                 <a:ea typeface="Calibri" panose="020F0502020204030204" pitchFamily="34" charset="0"/>
                 <a:cs typeface="Times New Roman" panose="02020603050405020304" pitchFamily="18" charset="0"/>
               </a:rPr>
-              <a:t>(n = </a:t>
-            </a:r>
-            <a:r>
-              <a:rPr kumimoji="0" lang="fr-FR" altLang="fr-FR" sz="1600" b="1" i="0" u="none" strike="noStrike" cap="none" normalizeH="0" baseline="0" noProof="1" smtClean="0">
-                <a:ln>
-                  <a:noFill/>
-                </a:ln>
-                <a:solidFill>
-                  <a:srgbClr val="0040CF"/>
-                </a:solidFill>
-                <a:effectLst/>
-                <a:latin typeface="Calibri" panose="020F0502020204030204" pitchFamily="34" charset="0"/>
-                <a:ea typeface="Calibri" panose="020F0502020204030204" pitchFamily="34" charset="0"/>
-                <a:cs typeface="Times New Roman" panose="02020603050405020304" pitchFamily="18" charset="0"/>
-              </a:rPr>
-              <a:t>3700)</a:t>
+              <a:t>(n = 3700)</a:t>
             </a:r>
             <a:endParaRPr kumimoji="0" lang="fr-FR" altLang="fr-FR" sz="400" b="0" i="0" u="none" strike="noStrike" cap="none" normalizeH="0" baseline="0" noProof="1" smtClean="0">
               <a:ln>
@@ -5604,22 +5574,7 @@
                 <a:ea typeface="Calibri" panose="020F0502020204030204" pitchFamily="34" charset="0"/>
                 <a:cs typeface="Times New Roman" panose="02020603050405020304" pitchFamily="18" charset="0"/>
               </a:rPr>
-              <a:t>Scopus (n = </a:t>
-            </a:r>
-            <a:r>
-              <a:rPr kumimoji="0" lang="fr-FR" altLang="fr-FR" sz="1400" b="0" i="0" u="none" strike="noStrike" cap="none" normalizeH="0" baseline="0" noProof="1" smtClean="0">
-                <a:ln>
-                  <a:noFill/>
-                </a:ln>
-                <a:solidFill>
-                  <a:srgbClr val="002060"/>
-                </a:solidFill>
-                <a:effectLst/>
-                <a:latin typeface="Calibri" panose="020F0502020204030204" pitchFamily="34" charset="0"/>
-                <a:ea typeface="Calibri" panose="020F0502020204030204" pitchFamily="34" charset="0"/>
-                <a:cs typeface="Times New Roman" panose="02020603050405020304" pitchFamily="18" charset="0"/>
-              </a:rPr>
-              <a:t>1663)</a:t>
+              <a:t>Scopus (n = 1663)</a:t>
             </a:r>
             <a:endParaRPr kumimoji="0" lang="fr-FR" altLang="fr-FR" sz="400" b="0" i="0" u="none" strike="noStrike" cap="none" normalizeH="0" baseline="0" noProof="1" smtClean="0">
               <a:ln>
@@ -5703,22 +5658,7 @@
                 <a:ea typeface="Calibri" panose="020F0502020204030204" pitchFamily="34" charset="0"/>
                 <a:cs typeface="Times New Roman" panose="02020603050405020304" pitchFamily="18" charset="0"/>
               </a:rPr>
-              <a:t>PubMed (n </a:t>
-            </a:r>
-            <a:r>
-              <a:rPr kumimoji="0" lang="fr-FR" altLang="fr-FR" sz="1400" b="0" i="0" u="none" strike="noStrike" cap="none" normalizeH="0" baseline="0" noProof="1" smtClean="0">
-                <a:ln>
-                  <a:noFill/>
-                </a:ln>
-                <a:solidFill>
-                  <a:srgbClr val="002060"/>
-                </a:solidFill>
-                <a:effectLst/>
-                <a:latin typeface="Calibri" panose="020F0502020204030204" pitchFamily="34" charset="0"/>
-                <a:ea typeface="Calibri" panose="020F0502020204030204" pitchFamily="34" charset="0"/>
-                <a:cs typeface="Times New Roman" panose="02020603050405020304" pitchFamily="18" charset="0"/>
-              </a:rPr>
-              <a:t>=</a:t>
+              <a:t>PubMed (n =</a:t>
             </a:r>
             <a:r>
               <a:rPr kumimoji="0" lang="fr-FR" altLang="fr-FR" sz="1400" b="0" i="0" u="none" strike="noStrike" cap="none" normalizeH="0" noProof="1" smtClean="0">
@@ -6175,8 +6115,26 @@
                 <a:ea typeface="Calibri" panose="020F0502020204030204" pitchFamily="34" charset="0"/>
                 <a:cs typeface="Times New Roman" panose="02020603050405020304" pitchFamily="18" charset="0"/>
               </a:rPr>
-              <a:t>References from corresponding authors </a:t>
-            </a:r>
+              <a:t>References sent by corresponding authors from included studies</a:t>
+            </a:r>
+          </a:p>
+          <a:p>
+            <a:pPr marL="0" marR="0" lvl="0" indent="0" algn="l" defTabSz="914400" rtl="0" eaLnBrk="0" fontAlgn="base" latinLnBrk="0" hangingPunct="0">
+              <a:lnSpc>
+                <a:spcPct val="100000"/>
+              </a:lnSpc>
+              <a:spcBef>
+                <a:spcPct val="0"/>
+              </a:spcBef>
+              <a:spcAft>
+                <a:spcPct val="0"/>
+              </a:spcAft>
+              <a:buClrTx/>
+              <a:buSzTx/>
+              <a:buFontTx/>
+              <a:buNone/>
+              <a:tabLst/>
+            </a:pPr>
             <a:r>
               <a:rPr kumimoji="0" lang="fr-FR" altLang="fr-FR" sz="1400" b="1" i="0" u="none" strike="noStrike" cap="none" normalizeH="0" baseline="0" noProof="1" smtClean="0">
                 <a:ln>
@@ -6256,8 +6214,8 @@
         </p:nvCxnSpPr>
         <p:spPr>
           <a:xfrm flipH="1">
-            <a:off x="2366328" y="5266849"/>
-            <a:ext cx="10795" cy="886301"/>
+            <a:off x="2366328" y="5330825"/>
+            <a:ext cx="3175" cy="822325"/>
           </a:xfrm>
           <a:prstGeom prst="straightConnector1">
             <a:avLst/>

</xml_diff>